<commit_message>
Alteracoes a diagramas e apresentacao 4
</commit_message>
<xml_diff>
--- a/Apresentacoes/Apresentacao4.pptx
+++ b/Apresentacoes/Apresentacao4.pptx
@@ -9,9 +9,10 @@
     <p:sldId id="257" r:id="rId3"/>
     <p:sldId id="260" r:id="rId4"/>
     <p:sldId id="263" r:id="rId5"/>
-    <p:sldId id="264" r:id="rId6"/>
-    <p:sldId id="265" r:id="rId7"/>
-    <p:sldId id="261" r:id="rId8"/>
+    <p:sldId id="266" r:id="rId6"/>
+    <p:sldId id="264" r:id="rId7"/>
+    <p:sldId id="265" r:id="rId8"/>
+    <p:sldId id="261" r:id="rId9"/>
   </p:sldIdLst>
   <p:sldSz cx="12192000" cy="6858000"/>
   <p:notesSz cx="6858000" cy="9144000"/>
@@ -112,7 +113,7 @@
   </p:defaultTextStyle>
   <p:extLst>
     <p:ext uri="{EFAFB233-063F-42B5-8137-9DF3F51BA10A}">
-      <p15:sldGuideLst xmlns="" xmlns:p15="http://schemas.microsoft.com/office/powerpoint/2012/main"/>
+      <p15:sldGuideLst xmlns:p15="http://schemas.microsoft.com/office/powerpoint/2012/main" xmlns=""/>
     </p:ext>
   </p:extLst>
 </p:presentation>
@@ -765,7 +766,7 @@
             <a:fld id="{B61BEF0D-F0BB-DE4B-95CE-6DB70DBA9567}" type="datetimeFigureOut">
               <a:rPr lang="en-US" smtClean="0"/>
               <a:pPr/>
-              <a:t>6/5/2013</a:t>
+              <a:t>6/6/2013</a:t>
             </a:fld>
             <a:endParaRPr lang="en-US" dirty="0"/>
           </a:p>
@@ -868,7 +869,7 @@
             <a:fld id="{D57F1E4F-1CFF-5643-939E-217C01CDF565}" type="slidenum">
               <a:rPr lang="en-US" smtClean="0"/>
               <a:pPr/>
-              <a:t>‹#›</a:t>
+              <a:t>‹nº›</a:t>
             </a:fld>
             <a:endParaRPr lang="en-US" dirty="0"/>
           </a:p>
@@ -877,7 +878,7 @@
     </p:spTree>
     <p:extLst>
       <p:ext uri="{BB962C8B-B14F-4D97-AF65-F5344CB8AC3E}">
-        <p14:creationId xmlns:p14="http://schemas.microsoft.com/office/powerpoint/2010/main" val="2366304032"/>
+        <p14:creationId xmlns:p14="http://schemas.microsoft.com/office/powerpoint/2010/main" xmlns="" val="2366304032"/>
       </p:ext>
     </p:extLst>
   </p:cSld>
@@ -1887,7 +1888,7 @@
             <a:fld id="{B61BEF0D-F0BB-DE4B-95CE-6DB70DBA9567}" type="datetimeFigureOut">
               <a:rPr lang="en-US" smtClean="0"/>
               <a:pPr/>
-              <a:t>6/5/2013</a:t>
+              <a:t>6/6/2013</a:t>
             </a:fld>
             <a:endParaRPr lang="en-US" dirty="0"/>
           </a:p>
@@ -1966,7 +1967,7 @@
             <a:fld id="{D57F1E4F-1CFF-5643-939E-217C01CDF565}" type="slidenum">
               <a:rPr lang="en-US" smtClean="0"/>
               <a:pPr/>
-              <a:t>‹#›</a:t>
+              <a:t>‹nº›</a:t>
             </a:fld>
             <a:endParaRPr lang="en-US" dirty="0"/>
           </a:p>
@@ -1975,7 +1976,7 @@
     </p:spTree>
     <p:extLst>
       <p:ext uri="{BB962C8B-B14F-4D97-AF65-F5344CB8AC3E}">
-        <p14:creationId xmlns:p14="http://schemas.microsoft.com/office/powerpoint/2010/main" val="4066567357"/>
+        <p14:creationId xmlns:p14="http://schemas.microsoft.com/office/powerpoint/2010/main" xmlns="" val="4066567357"/>
       </p:ext>
     </p:extLst>
   </p:cSld>
@@ -2900,7 +2901,7 @@
             <a:fld id="{B61BEF0D-F0BB-DE4B-95CE-6DB70DBA9567}" type="datetimeFigureOut">
               <a:rPr lang="en-US" smtClean="0"/>
               <a:pPr/>
-              <a:t>6/5/2013</a:t>
+              <a:t>6/6/2013</a:t>
             </a:fld>
             <a:endParaRPr lang="en-US" dirty="0"/>
           </a:p>
@@ -2979,7 +2980,7 @@
             <a:fld id="{D57F1E4F-1CFF-5643-939E-217C01CDF565}" type="slidenum">
               <a:rPr lang="en-US" smtClean="0"/>
               <a:pPr/>
-              <a:t>‹#›</a:t>
+              <a:t>‹nº›</a:t>
             </a:fld>
             <a:endParaRPr lang="en-US" dirty="0"/>
           </a:p>
@@ -2988,7 +2989,7 @@
     </p:spTree>
     <p:extLst>
       <p:ext uri="{BB962C8B-B14F-4D97-AF65-F5344CB8AC3E}">
-        <p14:creationId xmlns:p14="http://schemas.microsoft.com/office/powerpoint/2010/main" val="704902250"/>
+        <p14:creationId xmlns:p14="http://schemas.microsoft.com/office/powerpoint/2010/main" xmlns="" val="704902250"/>
       </p:ext>
     </p:extLst>
   </p:cSld>
@@ -4072,7 +4073,7 @@
             <a:fld id="{B61BEF0D-F0BB-DE4B-95CE-6DB70DBA9567}" type="datetimeFigureOut">
               <a:rPr lang="en-US" smtClean="0"/>
               <a:pPr/>
-              <a:t>6/5/2013</a:t>
+              <a:t>6/6/2013</a:t>
             </a:fld>
             <a:endParaRPr lang="en-US" dirty="0"/>
           </a:p>
@@ -4151,7 +4152,7 @@
             <a:fld id="{D57F1E4F-1CFF-5643-939E-217C01CDF565}" type="slidenum">
               <a:rPr lang="en-US" smtClean="0"/>
               <a:pPr/>
-              <a:t>‹#›</a:t>
+              <a:t>‹nº›</a:t>
             </a:fld>
             <a:endParaRPr lang="en-US" dirty="0"/>
           </a:p>
@@ -4160,7 +4161,7 @@
     </p:spTree>
     <p:extLst>
       <p:ext uri="{BB962C8B-B14F-4D97-AF65-F5344CB8AC3E}">
-        <p14:creationId xmlns:p14="http://schemas.microsoft.com/office/powerpoint/2010/main" val="4026379621"/>
+        <p14:creationId xmlns:p14="http://schemas.microsoft.com/office/powerpoint/2010/main" xmlns="" val="4026379621"/>
       </p:ext>
     </p:extLst>
   </p:cSld>
@@ -5135,7 +5136,7 @@
             <a:fld id="{B61BEF0D-F0BB-DE4B-95CE-6DB70DBA9567}" type="datetimeFigureOut">
               <a:rPr lang="en-US" smtClean="0"/>
               <a:pPr/>
-              <a:t>6/5/2013</a:t>
+              <a:t>6/6/2013</a:t>
             </a:fld>
             <a:endParaRPr lang="en-US" dirty="0"/>
           </a:p>
@@ -5214,7 +5215,7 @@
             <a:fld id="{D57F1E4F-1CFF-5643-939E-217C01CDF565}" type="slidenum">
               <a:rPr lang="en-US" smtClean="0"/>
               <a:pPr/>
-              <a:t>‹#›</a:t>
+              <a:t>‹nº›</a:t>
             </a:fld>
             <a:endParaRPr lang="en-US" dirty="0"/>
           </a:p>
@@ -5223,7 +5224,7 @@
     </p:spTree>
     <p:extLst>
       <p:ext uri="{BB962C8B-B14F-4D97-AF65-F5344CB8AC3E}">
-        <p14:creationId xmlns:p14="http://schemas.microsoft.com/office/powerpoint/2010/main" val="300525816"/>
+        <p14:creationId xmlns:p14="http://schemas.microsoft.com/office/powerpoint/2010/main" xmlns="" val="300525816"/>
       </p:ext>
     </p:extLst>
   </p:cSld>
@@ -5783,7 +5784,7 @@
             <a:fld id="{B61BEF0D-F0BB-DE4B-95CE-6DB70DBA9567}" type="datetimeFigureOut">
               <a:rPr lang="en-US" smtClean="0"/>
               <a:pPr/>
-              <a:t>6/5/2013</a:t>
+              <a:t>6/6/2013</a:t>
             </a:fld>
             <a:endParaRPr lang="en-US" dirty="0"/>
           </a:p>
@@ -5826,7 +5827,7 @@
             <a:fld id="{D57F1E4F-1CFF-5643-939E-217C01CDF565}" type="slidenum">
               <a:rPr lang="en-US" smtClean="0"/>
               <a:pPr/>
-              <a:t>‹#›</a:t>
+              <a:t>‹nº›</a:t>
             </a:fld>
             <a:endParaRPr lang="en-US" dirty="0"/>
           </a:p>
@@ -5835,7 +5836,7 @@
     </p:spTree>
     <p:extLst>
       <p:ext uri="{BB962C8B-B14F-4D97-AF65-F5344CB8AC3E}">
-        <p14:creationId xmlns:p14="http://schemas.microsoft.com/office/powerpoint/2010/main" val="3034232281"/>
+        <p14:creationId xmlns:p14="http://schemas.microsoft.com/office/powerpoint/2010/main" xmlns="" val="3034232281"/>
       </p:ext>
     </p:extLst>
   </p:cSld>
@@ -6632,7 +6633,7 @@
             <a:fld id="{B61BEF0D-F0BB-DE4B-95CE-6DB70DBA9567}" type="datetimeFigureOut">
               <a:rPr lang="en-US" smtClean="0"/>
               <a:pPr/>
-              <a:t>6/5/2013</a:t>
+              <a:t>6/6/2013</a:t>
             </a:fld>
             <a:endParaRPr lang="en-US" dirty="0"/>
           </a:p>
@@ -6675,7 +6676,7 @@
             <a:fld id="{D57F1E4F-1CFF-5643-939E-217C01CDF565}" type="slidenum">
               <a:rPr lang="en-US" smtClean="0"/>
               <a:pPr/>
-              <a:t>‹#›</a:t>
+              <a:t>‹nº›</a:t>
             </a:fld>
             <a:endParaRPr lang="en-US" dirty="0"/>
           </a:p>
@@ -6684,7 +6685,7 @@
     </p:spTree>
     <p:extLst>
       <p:ext uri="{BB962C8B-B14F-4D97-AF65-F5344CB8AC3E}">
-        <p14:creationId xmlns:p14="http://schemas.microsoft.com/office/powerpoint/2010/main" val="719354122"/>
+        <p14:creationId xmlns:p14="http://schemas.microsoft.com/office/powerpoint/2010/main" xmlns="" val="719354122"/>
       </p:ext>
     </p:extLst>
   </p:cSld>
@@ -6808,7 +6809,8 @@
           <a:p>
             <a:fld id="{55C6B4A9-1611-4792-9094-5F34BCA07E0B}" type="datetimeFigureOut">
               <a:rPr lang="en-US" smtClean="0"/>
-              <a:t>6/5/2013</a:t>
+              <a:pPr/>
+              <a:t>6/6/2013</a:t>
             </a:fld>
             <a:endParaRPr lang="en-US" dirty="0"/>
           </a:p>
@@ -6850,7 +6852,8 @@
           <a:p>
             <a:fld id="{89333C77-0158-454C-844F-B7AB9BD7DAD4}" type="slidenum">
               <a:rPr lang="en-US" smtClean="0"/>
-              <a:t>‹#›</a:t>
+              <a:pPr/>
+              <a:t>‹nº›</a:t>
             </a:fld>
             <a:endParaRPr lang="en-US" dirty="0"/>
           </a:p>
@@ -6859,7 +6862,7 @@
     </p:spTree>
     <p:extLst>
       <p:ext uri="{BB962C8B-B14F-4D97-AF65-F5344CB8AC3E}">
-        <p14:creationId xmlns:p14="http://schemas.microsoft.com/office/powerpoint/2010/main" val="2218831888"/>
+        <p14:creationId xmlns:p14="http://schemas.microsoft.com/office/powerpoint/2010/main" xmlns="" val="2218831888"/>
       </p:ext>
     </p:extLst>
   </p:cSld>
@@ -7807,7 +7810,7 @@
             <a:fld id="{B61BEF0D-F0BB-DE4B-95CE-6DB70DBA9567}" type="datetimeFigureOut">
               <a:rPr lang="en-US" smtClean="0"/>
               <a:pPr/>
-              <a:t>6/5/2013</a:t>
+              <a:t>6/6/2013</a:t>
             </a:fld>
             <a:endParaRPr lang="en-US" dirty="0"/>
           </a:p>
@@ -7886,7 +7889,7 @@
             <a:fld id="{D57F1E4F-1CFF-5643-939E-217C01CDF565}" type="slidenum">
               <a:rPr lang="en-US" smtClean="0"/>
               <a:pPr/>
-              <a:t>‹#›</a:t>
+              <a:t>‹nº›</a:t>
             </a:fld>
             <a:endParaRPr lang="en-US" dirty="0"/>
           </a:p>
@@ -7895,7 +7898,7 @@
     </p:spTree>
     <p:extLst>
       <p:ext uri="{BB962C8B-B14F-4D97-AF65-F5344CB8AC3E}">
-        <p14:creationId xmlns:p14="http://schemas.microsoft.com/office/powerpoint/2010/main" val="412353160"/>
+        <p14:creationId xmlns:p14="http://schemas.microsoft.com/office/powerpoint/2010/main" xmlns="" val="412353160"/>
       </p:ext>
     </p:extLst>
   </p:cSld>
@@ -8015,7 +8018,7 @@
             <a:fld id="{B61BEF0D-F0BB-DE4B-95CE-6DB70DBA9567}" type="datetimeFigureOut">
               <a:rPr lang="en-US" smtClean="0"/>
               <a:pPr/>
-              <a:t>6/5/2013</a:t>
+              <a:t>6/6/2013</a:t>
             </a:fld>
             <a:endParaRPr lang="en-US" dirty="0"/>
           </a:p>
@@ -8058,7 +8061,7 @@
             <a:fld id="{D57F1E4F-1CFF-5643-939E-217C01CDF565}" type="slidenum">
               <a:rPr lang="en-US" smtClean="0"/>
               <a:pPr/>
-              <a:t>‹#›</a:t>
+              <a:t>‹nº›</a:t>
             </a:fld>
             <a:endParaRPr lang="en-US" dirty="0"/>
           </a:p>
@@ -8067,7 +8070,7 @@
     </p:spTree>
     <p:extLst>
       <p:ext uri="{BB962C8B-B14F-4D97-AF65-F5344CB8AC3E}">
-        <p14:creationId xmlns:p14="http://schemas.microsoft.com/office/powerpoint/2010/main" val="3720808702"/>
+        <p14:creationId xmlns:p14="http://schemas.microsoft.com/office/powerpoint/2010/main" xmlns="" val="3720808702"/>
       </p:ext>
     </p:extLst>
   </p:cSld>
@@ -9079,7 +9082,7 @@
             <a:fld id="{B61BEF0D-F0BB-DE4B-95CE-6DB70DBA9567}" type="datetimeFigureOut">
               <a:rPr lang="en-US" smtClean="0"/>
               <a:pPr/>
-              <a:t>6/5/2013</a:t>
+              <a:t>6/6/2013</a:t>
             </a:fld>
             <a:endParaRPr lang="en-US" dirty="0"/>
           </a:p>
@@ -9158,7 +9161,7 @@
             <a:fld id="{D57F1E4F-1CFF-5643-939E-217C01CDF565}" type="slidenum">
               <a:rPr lang="en-US" smtClean="0"/>
               <a:pPr/>
-              <a:t>‹#›</a:t>
+              <a:t>‹nº›</a:t>
             </a:fld>
             <a:endParaRPr lang="en-US" dirty="0"/>
           </a:p>
@@ -9167,7 +9170,7 @@
     </p:spTree>
     <p:extLst>
       <p:ext uri="{BB962C8B-B14F-4D97-AF65-F5344CB8AC3E}">
-        <p14:creationId xmlns:p14="http://schemas.microsoft.com/office/powerpoint/2010/main" val="1204964069"/>
+        <p14:creationId xmlns:p14="http://schemas.microsoft.com/office/powerpoint/2010/main" xmlns="" val="1204964069"/>
       </p:ext>
     </p:extLst>
   </p:cSld>
@@ -9352,7 +9355,8 @@
           <a:p>
             <a:fld id="{EB712588-04B1-427B-82EE-E8DB90309F08}" type="datetimeFigureOut">
               <a:rPr lang="en-US" smtClean="0"/>
-              <a:t>6/5/2013</a:t>
+              <a:pPr/>
+              <a:t>6/6/2013</a:t>
             </a:fld>
             <a:endParaRPr lang="en-US" dirty="0"/>
           </a:p>
@@ -9394,7 +9398,8 @@
           <a:p>
             <a:fld id="{6FF9F0C5-380F-41C2-899A-BAC0F0927E16}" type="slidenum">
               <a:rPr lang="en-US" smtClean="0"/>
-              <a:t>‹#›</a:t>
+              <a:pPr/>
+              <a:t>‹nº›</a:t>
             </a:fld>
             <a:endParaRPr lang="en-US" dirty="0"/>
           </a:p>
@@ -9403,7 +9408,7 @@
     </p:spTree>
     <p:extLst>
       <p:ext uri="{BB962C8B-B14F-4D97-AF65-F5344CB8AC3E}">
-        <p14:creationId xmlns:p14="http://schemas.microsoft.com/office/powerpoint/2010/main" val="3416224205"/>
+        <p14:creationId xmlns:p14="http://schemas.microsoft.com/office/powerpoint/2010/main" xmlns="" val="3416224205"/>
       </p:ext>
     </p:extLst>
   </p:cSld>
@@ -9735,7 +9740,7 @@
             <a:fld id="{B61BEF0D-F0BB-DE4B-95CE-6DB70DBA9567}" type="datetimeFigureOut">
               <a:rPr lang="en-US" smtClean="0"/>
               <a:pPr/>
-              <a:t>6/5/2013</a:t>
+              <a:t>6/6/2013</a:t>
             </a:fld>
             <a:endParaRPr lang="en-US" dirty="0"/>
           </a:p>
@@ -9778,7 +9783,7 @@
             <a:fld id="{D57F1E4F-1CFF-5643-939E-217C01CDF565}" type="slidenum">
               <a:rPr lang="en-US" smtClean="0"/>
               <a:pPr/>
-              <a:t>‹#›</a:t>
+              <a:t>‹nº›</a:t>
             </a:fld>
             <a:endParaRPr lang="en-US" dirty="0"/>
           </a:p>
@@ -9787,7 +9792,7 @@
     </p:spTree>
     <p:extLst>
       <p:ext uri="{BB962C8B-B14F-4D97-AF65-F5344CB8AC3E}">
-        <p14:creationId xmlns:p14="http://schemas.microsoft.com/office/powerpoint/2010/main" val="397309849"/>
+        <p14:creationId xmlns:p14="http://schemas.microsoft.com/office/powerpoint/2010/main" xmlns="" val="397309849"/>
       </p:ext>
     </p:extLst>
   </p:cSld>
@@ -9855,7 +9860,7 @@
             <a:fld id="{B61BEF0D-F0BB-DE4B-95CE-6DB70DBA9567}" type="datetimeFigureOut">
               <a:rPr lang="en-US" smtClean="0"/>
               <a:pPr/>
-              <a:t>6/5/2013</a:t>
+              <a:t>6/6/2013</a:t>
             </a:fld>
             <a:endParaRPr lang="en-US" dirty="0"/>
           </a:p>
@@ -9898,7 +9903,7 @@
             <a:fld id="{D57F1E4F-1CFF-5643-939E-217C01CDF565}" type="slidenum">
               <a:rPr lang="en-US" smtClean="0"/>
               <a:pPr/>
-              <a:t>‹#›</a:t>
+              <a:t>‹nº›</a:t>
             </a:fld>
             <a:endParaRPr lang="en-US" dirty="0"/>
           </a:p>
@@ -9907,7 +9912,7 @@
     </p:spTree>
     <p:extLst>
       <p:ext uri="{BB962C8B-B14F-4D97-AF65-F5344CB8AC3E}">
-        <p14:creationId xmlns:p14="http://schemas.microsoft.com/office/powerpoint/2010/main" val="571747138"/>
+        <p14:creationId xmlns:p14="http://schemas.microsoft.com/office/powerpoint/2010/main" xmlns="" val="571747138"/>
       </p:ext>
     </p:extLst>
   </p:cSld>
@@ -9952,7 +9957,7 @@
             <a:fld id="{B61BEF0D-F0BB-DE4B-95CE-6DB70DBA9567}" type="datetimeFigureOut">
               <a:rPr lang="en-US" smtClean="0"/>
               <a:pPr/>
-              <a:t>6/5/2013</a:t>
+              <a:t>6/6/2013</a:t>
             </a:fld>
             <a:endParaRPr lang="en-US" dirty="0"/>
           </a:p>
@@ -10031,7 +10036,7 @@
             <a:fld id="{D57F1E4F-1CFF-5643-939E-217C01CDF565}" type="slidenum">
               <a:rPr lang="en-US" smtClean="0"/>
               <a:pPr/>
-              <a:t>‹#›</a:t>
+              <a:t>‹nº›</a:t>
             </a:fld>
             <a:endParaRPr lang="en-US" dirty="0"/>
           </a:p>
@@ -10040,7 +10045,7 @@
     </p:spTree>
     <p:extLst>
       <p:ext uri="{BB962C8B-B14F-4D97-AF65-F5344CB8AC3E}">
-        <p14:creationId xmlns:p14="http://schemas.microsoft.com/office/powerpoint/2010/main" val="3772123859"/>
+        <p14:creationId xmlns:p14="http://schemas.microsoft.com/office/powerpoint/2010/main" xmlns="" val="3772123859"/>
       </p:ext>
     </p:extLst>
   </p:cSld>
@@ -11062,7 +11067,8 @@
           <a:p>
             <a:fld id="{42A54C80-263E-416B-A8E0-580EDEADCBDC}" type="datetimeFigureOut">
               <a:rPr lang="en-US" smtClean="0"/>
-              <a:t>6/5/2013</a:t>
+              <a:pPr/>
+              <a:t>6/6/2013</a:t>
             </a:fld>
             <a:endParaRPr lang="en-US" dirty="0"/>
           </a:p>
@@ -11140,7 +11146,8 @@
           <a:p>
             <a:fld id="{519954A3-9DFD-4C44-94BA-B95130A3BA1C}" type="slidenum">
               <a:rPr lang="en-US" smtClean="0"/>
-              <a:t>‹#›</a:t>
+              <a:pPr/>
+              <a:t>‹nº›</a:t>
             </a:fld>
             <a:endParaRPr lang="en-US" dirty="0"/>
           </a:p>
@@ -11149,7 +11156,7 @@
     </p:spTree>
     <p:extLst>
       <p:ext uri="{BB962C8B-B14F-4D97-AF65-F5344CB8AC3E}">
-        <p14:creationId xmlns:p14="http://schemas.microsoft.com/office/powerpoint/2010/main" val="661120729"/>
+        <p14:creationId xmlns:p14="http://schemas.microsoft.com/office/powerpoint/2010/main" xmlns="" val="661120729"/>
       </p:ext>
     </p:extLst>
   </p:cSld>
@@ -12196,7 +12203,7 @@
             <a:fld id="{B61BEF0D-F0BB-DE4B-95CE-6DB70DBA9567}" type="datetimeFigureOut">
               <a:rPr lang="en-US" smtClean="0"/>
               <a:pPr/>
-              <a:t>6/5/2013</a:t>
+              <a:t>6/6/2013</a:t>
             </a:fld>
             <a:endParaRPr lang="en-US" dirty="0"/>
           </a:p>
@@ -12275,7 +12282,7 @@
             <a:fld id="{D57F1E4F-1CFF-5643-939E-217C01CDF565}" type="slidenum">
               <a:rPr lang="en-US" smtClean="0"/>
               <a:pPr/>
-              <a:t>‹#›</a:t>
+              <a:t>‹nº›</a:t>
             </a:fld>
             <a:endParaRPr lang="en-US" dirty="0"/>
           </a:p>
@@ -12284,7 +12291,7 @@
     </p:spTree>
     <p:extLst>
       <p:ext uri="{BB962C8B-B14F-4D97-AF65-F5344CB8AC3E}">
-        <p14:creationId xmlns:p14="http://schemas.microsoft.com/office/powerpoint/2010/main" val="1408843535"/>
+        <p14:creationId xmlns:p14="http://schemas.microsoft.com/office/powerpoint/2010/main" xmlns="" val="1408843535"/>
       </p:ext>
     </p:extLst>
   </p:cSld>
@@ -13226,7 +13233,7 @@
             <a:fld id="{B61BEF0D-F0BB-DE4B-95CE-6DB70DBA9567}" type="datetimeFigureOut">
               <a:rPr lang="en-US" smtClean="0"/>
               <a:pPr/>
-              <a:t>6/5/2013</a:t>
+              <a:t>6/6/2013</a:t>
             </a:fld>
             <a:endParaRPr lang="en-US" dirty="0"/>
           </a:p>
@@ -13339,7 +13346,7 @@
             <a:fld id="{D57F1E4F-1CFF-5643-939E-217C01CDF565}" type="slidenum">
               <a:rPr lang="en-US" smtClean="0"/>
               <a:pPr/>
-              <a:t>‹#›</a:t>
+              <a:t>‹nº›</a:t>
             </a:fld>
             <a:endParaRPr lang="en-US" dirty="0"/>
           </a:p>
@@ -13348,7 +13355,7 @@
     </p:spTree>
     <p:extLst>
       <p:ext uri="{BB962C8B-B14F-4D97-AF65-F5344CB8AC3E}">
-        <p14:creationId xmlns:p14="http://schemas.microsoft.com/office/powerpoint/2010/main" val="95235215"/>
+        <p14:creationId xmlns:p14="http://schemas.microsoft.com/office/powerpoint/2010/main" xmlns="" val="95235215"/>
       </p:ext>
     </p:extLst>
   </p:cSld>
@@ -13942,7 +13949,7 @@
     </p:spTree>
     <p:extLst>
       <p:ext uri="{BB962C8B-B14F-4D97-AF65-F5344CB8AC3E}">
-        <p14:creationId xmlns:p14="http://schemas.microsoft.com/office/powerpoint/2010/main" val="326348055"/>
+        <p14:creationId xmlns:p14="http://schemas.microsoft.com/office/powerpoint/2010/main" xmlns="" val="326348055"/>
       </p:ext>
     </p:extLst>
   </p:cSld>
@@ -14069,7 +14076,7 @@
     </p:spTree>
     <p:extLst>
       <p:ext uri="{BB962C8B-B14F-4D97-AF65-F5344CB8AC3E}">
-        <p14:creationId xmlns:p14="http://schemas.microsoft.com/office/powerpoint/2010/main" val="1904567464"/>
+        <p14:creationId xmlns:p14="http://schemas.microsoft.com/office/powerpoint/2010/main" xmlns="" val="1904567464"/>
       </p:ext>
     </p:extLst>
   </p:cSld>
@@ -14126,8 +14133,8 @@
           <a:lstStyle/>
           <a:p>
             <a:r>
-              <a:rPr lang="pt-PT" dirty="0" smtClean="0"/>
-              <a:t>Desenvolvimento</a:t>
+              <a:rPr lang="pt-PT" dirty="0" err="1" smtClean="0"/>
+              <a:t>Guest</a:t>
             </a:r>
             <a:endParaRPr lang="pt-PT" dirty="0">
               <a:solidFill>
@@ -14213,7 +14220,7 @@
           <a:blip r:embed="rId2">
             <a:extLst>
               <a:ext uri="{28A0092B-C50C-407E-A947-70E740481C1C}">
-                <a14:useLocalDpi xmlns:a14="http://schemas.microsoft.com/office/drawing/2010/main" val="0"/>
+                <a14:useLocalDpi xmlns:a14="http://schemas.microsoft.com/office/drawing/2010/main" xmlns="" val="0"/>
               </a:ext>
             </a:extLst>
           </a:blip>
@@ -14233,7 +14240,7 @@
           <a:noFill/>
           <a:extLst>
             <a:ext uri="{909E8E84-426E-40DD-AFC4-6F175D3DCCD1}">
-              <a14:hiddenFill xmlns:a14="http://schemas.microsoft.com/office/drawing/2010/main">
+              <a14:hiddenFill xmlns:a14="http://schemas.microsoft.com/office/drawing/2010/main" xmlns="">
                 <a:solidFill>
                   <a:srgbClr val="FFFFFF"/>
                 </a:solidFill>
@@ -14245,7 +14252,7 @@
     </p:spTree>
     <p:extLst>
       <p:ext uri="{BB962C8B-B14F-4D97-AF65-F5344CB8AC3E}">
-        <p14:creationId xmlns:p14="http://schemas.microsoft.com/office/powerpoint/2010/main" val="3505641894"/>
+        <p14:creationId xmlns:p14="http://schemas.microsoft.com/office/powerpoint/2010/main" xmlns="" val="3505641894"/>
       </p:ext>
     </p:extLst>
   </p:cSld>
@@ -14303,7 +14310,7 @@
           <a:p>
             <a:r>
               <a:rPr lang="pt-PT" dirty="0" smtClean="0"/>
-              <a:t>Desenvolvimento</a:t>
+              <a:t>Utilizador</a:t>
             </a:r>
             <a:endParaRPr lang="pt-PT" dirty="0">
               <a:solidFill>
@@ -14335,47 +14342,6 @@
           </a:p>
         </p:txBody>
       </p:sp>
-      <p:pic>
-        <p:nvPicPr>
-          <p:cNvPr id="2050" name="Picture 2" descr="C:\git\documents\Diagramas\Utilizador.jpg"/>
-          <p:cNvPicPr>
-            <a:picLocks noChangeAspect="1" noChangeArrowheads="1"/>
-          </p:cNvPicPr>
-          <p:nvPr/>
-        </p:nvPicPr>
-        <p:blipFill>
-          <a:blip r:embed="rId2">
-            <a:extLst>
-              <a:ext uri="{28A0092B-C50C-407E-A947-70E740481C1C}">
-                <a14:useLocalDpi xmlns:a14="http://schemas.microsoft.com/office/drawing/2010/main" val="0"/>
-              </a:ext>
-            </a:extLst>
-          </a:blip>
-          <a:srcRect/>
-          <a:stretch>
-            <a:fillRect/>
-          </a:stretch>
-        </p:blipFill>
-        <p:spPr bwMode="auto">
-          <a:xfrm>
-            <a:off x="1225550" y="1689100"/>
-            <a:ext cx="9239250" cy="5168900"/>
-          </a:xfrm>
-          <a:prstGeom prst="rect">
-            <a:avLst/>
-          </a:prstGeom>
-          <a:noFill/>
-          <a:extLst>
-            <a:ext uri="{909E8E84-426E-40DD-AFC4-6F175D3DCCD1}">
-              <a14:hiddenFill xmlns:a14="http://schemas.microsoft.com/office/drawing/2010/main">
-                <a:solidFill>
-                  <a:srgbClr val="FFFFFF"/>
-                </a:solidFill>
-              </a14:hiddenFill>
-            </a:ext>
-          </a:extLst>
-        </p:spPr>
-      </p:pic>
       <p:sp>
         <p:nvSpPr>
           <p:cNvPr id="7" name="CaixaDeTexto 6"/>
@@ -14418,10 +14384,36 @@
           </a:p>
         </p:txBody>
       </p:sp>
+      <p:pic>
+        <p:nvPicPr>
+          <p:cNvPr id="1026" name="Picture 2" descr="C:\Users\André\Desktop\utilizadortestes.png"/>
+          <p:cNvPicPr>
+            <a:picLocks noChangeAspect="1" noChangeArrowheads="1"/>
+          </p:cNvPicPr>
+          <p:nvPr/>
+        </p:nvPicPr>
+        <p:blipFill>
+          <a:blip r:embed="rId2"/>
+          <a:srcRect/>
+          <a:stretch>
+            <a:fillRect/>
+          </a:stretch>
+        </p:blipFill>
+        <p:spPr bwMode="auto">
+          <a:xfrm>
+            <a:off x="347110" y="1878676"/>
+            <a:ext cx="11374749" cy="4339243"/>
+          </a:xfrm>
+          <a:prstGeom prst="rect">
+            <a:avLst/>
+          </a:prstGeom>
+          <a:noFill/>
+        </p:spPr>
+      </p:pic>
     </p:spTree>
     <p:extLst>
       <p:ext uri="{BB962C8B-B14F-4D97-AF65-F5344CB8AC3E}">
-        <p14:creationId xmlns:p14="http://schemas.microsoft.com/office/powerpoint/2010/main" val="745306495"/>
+        <p14:creationId xmlns:p14="http://schemas.microsoft.com/office/powerpoint/2010/main" xmlns="" val="745306495"/>
       </p:ext>
     </p:extLst>
   </p:cSld>
@@ -14479,7 +14471,7 @@
           <a:p>
             <a:r>
               <a:rPr lang="pt-PT" dirty="0" smtClean="0"/>
-              <a:t>Desenvolvimento</a:t>
+              <a:t>Utilizador</a:t>
             </a:r>
             <a:endParaRPr lang="pt-PT" dirty="0">
               <a:solidFill>
@@ -14511,47 +14503,6 @@
           </a:p>
         </p:txBody>
       </p:sp>
-      <p:pic>
-        <p:nvPicPr>
-          <p:cNvPr id="3074" name="Picture 2" descr="C:\git\documents\Diagramas\Utilizador-Professor.jpg"/>
-          <p:cNvPicPr>
-            <a:picLocks noChangeAspect="1" noChangeArrowheads="1"/>
-          </p:cNvPicPr>
-          <p:nvPr/>
-        </p:nvPicPr>
-        <p:blipFill>
-          <a:blip r:embed="rId2">
-            <a:extLst>
-              <a:ext uri="{28A0092B-C50C-407E-A947-70E740481C1C}">
-                <a14:useLocalDpi xmlns:a14="http://schemas.microsoft.com/office/drawing/2010/main" val="0"/>
-              </a:ext>
-            </a:extLst>
-          </a:blip>
-          <a:srcRect/>
-          <a:stretch>
-            <a:fillRect/>
-          </a:stretch>
-        </p:blipFill>
-        <p:spPr bwMode="auto">
-          <a:xfrm>
-            <a:off x="1574800" y="1832931"/>
-            <a:ext cx="8767456" cy="4799029"/>
-          </a:xfrm>
-          <a:prstGeom prst="rect">
-            <a:avLst/>
-          </a:prstGeom>
-          <a:noFill/>
-          <a:extLst>
-            <a:ext uri="{909E8E84-426E-40DD-AFC4-6F175D3DCCD1}">
-              <a14:hiddenFill xmlns:a14="http://schemas.microsoft.com/office/drawing/2010/main">
-                <a:solidFill>
-                  <a:srgbClr val="FFFFFF"/>
-                </a:solidFill>
-              </a14:hiddenFill>
-            </a:ext>
-          </a:extLst>
-        </p:spPr>
-      </p:pic>
       <p:sp>
         <p:nvSpPr>
           <p:cNvPr id="7" name="CaixaDeTexto 6"/>
@@ -14594,10 +14545,36 @@
           </a:p>
         </p:txBody>
       </p:sp>
+      <p:pic>
+        <p:nvPicPr>
+          <p:cNvPr id="2050" name="Picture 2" descr="C:\Users\André\Desktop\utilizadorflux.png"/>
+          <p:cNvPicPr>
+            <a:picLocks noChangeAspect="1" noChangeArrowheads="1"/>
+          </p:cNvPicPr>
+          <p:nvPr/>
+        </p:nvPicPr>
+        <p:blipFill>
+          <a:blip r:embed="rId2"/>
+          <a:srcRect/>
+          <a:stretch>
+            <a:fillRect/>
+          </a:stretch>
+        </p:blipFill>
+        <p:spPr bwMode="auto">
+          <a:xfrm>
+            <a:off x="0" y="1979526"/>
+            <a:ext cx="12070979" cy="4005638"/>
+          </a:xfrm>
+          <a:prstGeom prst="rect">
+            <a:avLst/>
+          </a:prstGeom>
+          <a:noFill/>
+        </p:spPr>
+      </p:pic>
     </p:spTree>
     <p:extLst>
       <p:ext uri="{BB962C8B-B14F-4D97-AF65-F5344CB8AC3E}">
-        <p14:creationId xmlns:p14="http://schemas.microsoft.com/office/powerpoint/2010/main" val="2937025122"/>
+        <p14:creationId xmlns:p14="http://schemas.microsoft.com/office/powerpoint/2010/main" xmlns="" val="745306495"/>
       </p:ext>
     </p:extLst>
   </p:cSld>
@@ -14655,7 +14632,7 @@
           <a:p>
             <a:r>
               <a:rPr lang="pt-PT" dirty="0" smtClean="0"/>
-              <a:t>Desenvolvimento</a:t>
+              <a:t>Professor</a:t>
             </a:r>
             <a:endParaRPr lang="pt-PT" dirty="0">
               <a:solidFill>
@@ -14670,7 +14647,7 @@
       </p:sp>
       <p:sp>
         <p:nvSpPr>
-          <p:cNvPr id="4" name="Content Placeholder 3"/>
+          <p:cNvPr id="6" name="Content Placeholder 5"/>
           <p:cNvSpPr>
             <a:spLocks noGrp="1"/>
           </p:cNvSpPr>
@@ -14689,7 +14666,7 @@
       </p:sp>
       <p:pic>
         <p:nvPicPr>
-          <p:cNvPr id="4098" name="Picture 2" descr="C:\git\documents\Diagramas\AdminSistema.jpg"/>
+          <p:cNvPr id="3074" name="Picture 2" descr="C:\git\documents\Diagramas\Utilizador-Professor.jpg"/>
           <p:cNvPicPr>
             <a:picLocks noChangeAspect="1" noChangeArrowheads="1"/>
           </p:cNvPicPr>
@@ -14699,7 +14676,7 @@
           <a:blip r:embed="rId2">
             <a:extLst>
               <a:ext uri="{28A0092B-C50C-407E-A947-70E740481C1C}">
-                <a14:useLocalDpi xmlns:a14="http://schemas.microsoft.com/office/drawing/2010/main" val="0"/>
+                <a14:useLocalDpi xmlns:a14="http://schemas.microsoft.com/office/drawing/2010/main" xmlns="" val="0"/>
               </a:ext>
             </a:extLst>
           </a:blip>
@@ -14710,8 +14687,8 @@
         </p:blipFill>
         <p:spPr bwMode="auto">
           <a:xfrm>
-            <a:off x="2068513" y="1714500"/>
-            <a:ext cx="7202487" cy="5143500"/>
+            <a:off x="1574800" y="1832931"/>
+            <a:ext cx="8767456" cy="4799029"/>
           </a:xfrm>
           <a:prstGeom prst="rect">
             <a:avLst/>
@@ -14719,7 +14696,7 @@
           <a:noFill/>
           <a:extLst>
             <a:ext uri="{909E8E84-426E-40DD-AFC4-6F175D3DCCD1}">
-              <a14:hiddenFill xmlns:a14="http://schemas.microsoft.com/office/drawing/2010/main">
+              <a14:hiddenFill xmlns:a14="http://schemas.microsoft.com/office/drawing/2010/main" xmlns="">
                 <a:solidFill>
                   <a:srgbClr val="FFFFFF"/>
                 </a:solidFill>
@@ -14773,7 +14750,7 @@
     </p:spTree>
     <p:extLst>
       <p:ext uri="{BB962C8B-B14F-4D97-AF65-F5344CB8AC3E}">
-        <p14:creationId xmlns:p14="http://schemas.microsoft.com/office/powerpoint/2010/main" val="3205123986"/>
+        <p14:creationId xmlns:p14="http://schemas.microsoft.com/office/powerpoint/2010/main" xmlns="" val="2937025122"/>
       </p:ext>
     </p:extLst>
   </p:cSld>
@@ -14817,6 +14794,182 @@
             <p:ph type="title"/>
           </p:nvPr>
         </p:nvSpPr>
+        <p:spPr>
+          <a:xfrm>
+            <a:off x="1116316" y="1115336"/>
+            <a:ext cx="8761413" cy="706964"/>
+          </a:xfrm>
+        </p:spPr>
+        <p:txBody>
+          <a:bodyPr>
+            <a:normAutofit/>
+          </a:bodyPr>
+          <a:lstStyle/>
+          <a:p>
+            <a:r>
+              <a:rPr lang="pt-PT" dirty="0" smtClean="0"/>
+              <a:t>Administrador e Sistema</a:t>
+            </a:r>
+            <a:endParaRPr lang="pt-PT" dirty="0">
+              <a:solidFill>
+                <a:schemeClr val="tx1">
+                  <a:lumMod val="75000"/>
+                  <a:lumOff val="25000"/>
+                </a:schemeClr>
+              </a:solidFill>
+            </a:endParaRPr>
+          </a:p>
+        </p:txBody>
+      </p:sp>
+      <p:sp>
+        <p:nvSpPr>
+          <p:cNvPr id="4" name="Content Placeholder 3"/>
+          <p:cNvSpPr>
+            <a:spLocks noGrp="1"/>
+          </p:cNvSpPr>
+          <p:nvPr>
+            <p:ph sz="half" idx="1"/>
+          </p:nvPr>
+        </p:nvSpPr>
+        <p:spPr/>
+        <p:txBody>
+          <a:bodyPr/>
+          <a:lstStyle/>
+          <a:p>
+            <a:endParaRPr lang="en-US"/>
+          </a:p>
+        </p:txBody>
+      </p:sp>
+      <p:pic>
+        <p:nvPicPr>
+          <p:cNvPr id="4098" name="Picture 2" descr="C:\git\documents\Diagramas\AdminSistema.jpg"/>
+          <p:cNvPicPr>
+            <a:picLocks noChangeAspect="1" noChangeArrowheads="1"/>
+          </p:cNvPicPr>
+          <p:nvPr/>
+        </p:nvPicPr>
+        <p:blipFill>
+          <a:blip r:embed="rId2">
+            <a:extLst>
+              <a:ext uri="{28A0092B-C50C-407E-A947-70E740481C1C}">
+                <a14:useLocalDpi xmlns:a14="http://schemas.microsoft.com/office/drawing/2010/main" xmlns="" val="0"/>
+              </a:ext>
+            </a:extLst>
+          </a:blip>
+          <a:srcRect/>
+          <a:stretch>
+            <a:fillRect/>
+          </a:stretch>
+        </p:blipFill>
+        <p:spPr bwMode="auto">
+          <a:xfrm>
+            <a:off x="2068513" y="1714500"/>
+            <a:ext cx="7202487" cy="5143500"/>
+          </a:xfrm>
+          <a:prstGeom prst="rect">
+            <a:avLst/>
+          </a:prstGeom>
+          <a:noFill/>
+          <a:extLst>
+            <a:ext uri="{909E8E84-426E-40DD-AFC4-6F175D3DCCD1}">
+              <a14:hiddenFill xmlns:a14="http://schemas.microsoft.com/office/drawing/2010/main" xmlns="">
+                <a:solidFill>
+                  <a:srgbClr val="FFFFFF"/>
+                </a:solidFill>
+              </a14:hiddenFill>
+            </a:ext>
+          </a:extLst>
+        </p:spPr>
+      </p:pic>
+      <p:sp>
+        <p:nvSpPr>
+          <p:cNvPr id="7" name="CaixaDeTexto 6"/>
+          <p:cNvSpPr txBox="1"/>
+          <p:nvPr/>
+        </p:nvSpPr>
+        <p:spPr>
+          <a:xfrm>
+            <a:off x="321972" y="6293407"/>
+            <a:ext cx="3773510" cy="338554"/>
+          </a:xfrm>
+          <a:prstGeom prst="rect">
+            <a:avLst/>
+          </a:prstGeom>
+          <a:noFill/>
+        </p:spPr>
+        <p:txBody>
+          <a:bodyPr wrap="square" rtlCol="0">
+            <a:spAutoFit/>
+          </a:bodyPr>
+          <a:lstStyle/>
+          <a:p>
+            <a:r>
+              <a:rPr lang="pt-PT" sz="1600" dirty="0" smtClean="0">
+                <a:solidFill>
+                  <a:schemeClr val="bg1">
+                    <a:lumMod val="65000"/>
+                  </a:schemeClr>
+                </a:solidFill>
+              </a:rPr>
+              <a:t>Analise de Sistemas</a:t>
+            </a:r>
+            <a:endParaRPr lang="pt-PT" sz="1600" dirty="0">
+              <a:solidFill>
+                <a:schemeClr val="bg1">
+                  <a:lumMod val="65000"/>
+                </a:schemeClr>
+              </a:solidFill>
+            </a:endParaRPr>
+          </a:p>
+        </p:txBody>
+      </p:sp>
+    </p:spTree>
+    <p:extLst>
+      <p:ext uri="{BB962C8B-B14F-4D97-AF65-F5344CB8AC3E}">
+        <p14:creationId xmlns:p14="http://schemas.microsoft.com/office/powerpoint/2010/main" xmlns="" val="3205123986"/>
+      </p:ext>
+    </p:extLst>
+  </p:cSld>
+  <p:clrMapOvr>
+    <a:masterClrMapping/>
+  </p:clrMapOvr>
+  <p:timing>
+    <p:tnLst>
+      <p:par>
+        <p:cTn id="1" dur="indefinite" restart="never" nodeType="tmRoot"/>
+      </p:par>
+    </p:tnLst>
+  </p:timing>
+</p:sld>
+</file>
+
+<file path=ppt/slides/slide8.xml><?xml version="1.0" encoding="utf-8"?>
+<p:sld xmlns:a="http://schemas.openxmlformats.org/drawingml/2006/main" xmlns:r="http://schemas.openxmlformats.org/officeDocument/2006/relationships" xmlns:p="http://schemas.openxmlformats.org/presentationml/2006/main">
+  <p:cSld>
+    <p:spTree>
+      <p:nvGrpSpPr>
+        <p:cNvPr id="1" name=""/>
+        <p:cNvGrpSpPr/>
+        <p:nvPr/>
+      </p:nvGrpSpPr>
+      <p:grpSpPr>
+        <a:xfrm>
+          <a:off x="0" y="0"/>
+          <a:ext cx="0" cy="0"/>
+          <a:chOff x="0" y="0"/>
+          <a:chExt cx="0" cy="0"/>
+        </a:xfrm>
+      </p:grpSpPr>
+      <p:sp>
+        <p:nvSpPr>
+          <p:cNvPr id="2" name="Title 1"/>
+          <p:cNvSpPr>
+            <a:spLocks noGrp="1"/>
+          </p:cNvSpPr>
+          <p:nvPr>
+            <p:ph type="title"/>
+          </p:nvPr>
+        </p:nvSpPr>
         <p:spPr/>
         <p:txBody>
           <a:bodyPr/>
@@ -14899,7 +15052,7 @@
     </p:spTree>
     <p:extLst>
       <p:ext uri="{BB962C8B-B14F-4D97-AF65-F5344CB8AC3E}">
-        <p14:creationId xmlns:p14="http://schemas.microsoft.com/office/powerpoint/2010/main" val="2431271499"/>
+        <p14:creationId xmlns:p14="http://schemas.microsoft.com/office/powerpoint/2010/main" xmlns="" val="2431271499"/>
       </p:ext>
     </p:extLst>
   </p:cSld>
@@ -15175,7 +15328,7 @@
   <a:extraClrSchemeLst/>
   <a:extLst>
     <a:ext uri="{05A4C25C-085E-4340-85A3-A5531E510DB2}">
-      <thm15:themeFamily xmlns="" xmlns:thm15="http://schemas.microsoft.com/office/thememl/2012/main" name="Ion Boardroom" id="{FC33163D-4339-46B1-8EED-24C834239D99}" vid="{A3AB87EF-B655-4FFF-8D05-F333AD7F2789}"/>
+      <thm15:themeFamily xmlns:thm15="http://schemas.microsoft.com/office/thememl/2012/main" xmlns="" name="Ion Boardroom" id="{FC33163D-4339-46B1-8EED-24C834239D99}" vid="{A3AB87EF-B655-4FFF-8D05-F333AD7F2789}"/>
     </a:ext>
   </a:extLst>
 </a:theme>

</xml_diff>